<commit_message>
Added a new image
</commit_message>
<xml_diff>
--- a/Reports/DesignFairPoster/DesignFairPoster.pptx
+++ b/Reports/DesignFairPoster/DesignFairPoster.pptx
@@ -3160,7 +3160,7 @@
         </p:blipFill>
         <p:spPr>
           <a:xfrm>
-            <a:off x="38273721" y="25742900"/>
+            <a:off x="38771757" y="25548255"/>
             <a:ext cx="4699000" cy="7175500"/>
           </a:xfrm>
           <a:prstGeom prst="rect">
@@ -3312,7 +3312,7 @@
       </p:sp>
       <p:pic>
         <p:nvPicPr>
-          <p:cNvPr id="10" name="Picture 9"/>
+          <p:cNvPr id="11" name="Picture 10"/>
           <p:cNvPicPr>
             <a:picLocks noChangeAspect="1"/>
           </p:cNvPicPr>
@@ -3320,30 +3320,6 @@
         </p:nvPicPr>
         <p:blipFill>
           <a:blip r:embed="rId3"/>
-          <a:stretch>
-            <a:fillRect/>
-          </a:stretch>
-        </p:blipFill>
-        <p:spPr>
-          <a:xfrm>
-            <a:off x="2194560" y="16161070"/>
-            <a:ext cx="8584812" cy="5894904"/>
-          </a:xfrm>
-          <a:prstGeom prst="rect">
-            <a:avLst/>
-          </a:prstGeom>
-        </p:spPr>
-      </p:pic>
-      <p:pic>
-        <p:nvPicPr>
-          <p:cNvPr id="11" name="Picture 10"/>
-          <p:cNvPicPr>
-            <a:picLocks noChangeAspect="1"/>
-          </p:cNvPicPr>
-          <p:nvPr/>
-        </p:nvPicPr>
-        <p:blipFill>
-          <a:blip r:embed="rId4"/>
           <a:stretch>
             <a:fillRect/>
           </a:stretch>
@@ -3392,25 +3368,60 @@
           <a:p>
             <a:r>
               <a:rPr lang="en-US" sz="8000" dirty="0" smtClean="0"/>
-              <a:t>--the sensor/hardware component which </a:t>
-            </a:r>
-          </a:p>
-          <a:p>
+              <a:t>--the </a:t>
+            </a:r>
             <a:r>
               <a:rPr lang="en-US" sz="8000" dirty="0" smtClean="0"/>
-              <a:t>Deals with the development of a prototype </a:t>
-            </a:r>
-          </a:p>
-          <a:p>
+              <a:t>sensor / hardware </a:t>
+            </a:r>
             <a:r>
               <a:rPr lang="en-US" sz="8000" dirty="0" smtClean="0"/>
-              <a:t>Smart shelf that can update sensor readings</a:t>
-            </a:r>
+              <a:t>component which </a:t>
+            </a:r>
+            <a:endParaRPr lang="en-US" sz="8000" dirty="0" smtClean="0"/>
           </a:p>
           <a:p>
             <a:r>
               <a:rPr lang="en-US" sz="8000" dirty="0" smtClean="0"/>
-              <a:t>To OGC </a:t>
+              <a:t>d</a:t>
+            </a:r>
+            <a:r>
+              <a:rPr lang="en-US" sz="8000" dirty="0" smtClean="0"/>
+              <a:t>eals </a:t>
+            </a:r>
+            <a:r>
+              <a:rPr lang="en-US" sz="8000" dirty="0" smtClean="0"/>
+              <a:t>with the development of a prototype </a:t>
+            </a:r>
+            <a:endParaRPr lang="en-US" sz="8000" dirty="0" smtClean="0"/>
+          </a:p>
+          <a:p>
+            <a:r>
+              <a:rPr lang="en-US" sz="8000" dirty="0" smtClean="0"/>
+              <a:t>s</a:t>
+            </a:r>
+            <a:r>
+              <a:rPr lang="en-US" sz="8000" dirty="0" smtClean="0"/>
+              <a:t>mart </a:t>
+            </a:r>
+            <a:r>
+              <a:rPr lang="en-US" sz="8000" dirty="0" smtClean="0"/>
+              <a:t>shelf that can update sensor readings</a:t>
+            </a:r>
+            <a:endParaRPr lang="en-US" sz="8000" dirty="0" smtClean="0"/>
+          </a:p>
+          <a:p>
+            <a:r>
+              <a:rPr lang="en-US" sz="8000" dirty="0" smtClean="0"/>
+              <a:t>t</a:t>
+            </a:r>
+            <a:r>
+              <a:rPr lang="en-US" sz="8000" dirty="0" smtClean="0"/>
+              <a:t>o </a:t>
+            </a:r>
+            <a:r>
+              <a:rPr lang="en-US" sz="8000" dirty="0" smtClean="0"/>
+              <a:t>OGC </a:t>
             </a:r>
             <a:r>
               <a:rPr lang="en-US" sz="8000" dirty="0" err="1" smtClean="0"/>
@@ -3418,30 +3429,77 @@
             </a:r>
             <a:r>
               <a:rPr lang="en-US" sz="8000" dirty="0" smtClean="0"/>
-              <a:t> API, and a software/</a:t>
-            </a:r>
+              <a:t> API, and a </a:t>
+            </a:r>
+            <a:r>
+              <a:rPr lang="en-US" sz="8000" dirty="0" smtClean="0"/>
+              <a:t>software /</a:t>
+            </a:r>
+            <a:endParaRPr lang="en-US" sz="8000" dirty="0" smtClean="0"/>
           </a:p>
           <a:p>
             <a:r>
               <a:rPr lang="en-US" sz="8000" dirty="0" smtClean="0"/>
               <a:t>Web component, which allows a user to </a:t>
             </a:r>
+            <a:endParaRPr lang="en-US" sz="8000" dirty="0" smtClean="0"/>
           </a:p>
           <a:p>
             <a:r>
               <a:rPr lang="en-US" sz="8000" dirty="0" smtClean="0"/>
-              <a:t>Interact/acquire readings from the prototype</a:t>
-            </a:r>
-          </a:p>
-          <a:p>
+              <a:t>i</a:t>
+            </a:r>
             <a:r>
               <a:rPr lang="en-US" sz="8000" dirty="0" smtClean="0"/>
-              <a:t>Shelves.</a:t>
+              <a:t>nteract</a:t>
+            </a:r>
+            <a:r>
+              <a:rPr lang="en-US" sz="8000" dirty="0" smtClean="0"/>
+              <a:t>/acquire readings from the prototype</a:t>
+            </a:r>
+            <a:endParaRPr lang="en-US" sz="8000" dirty="0" smtClean="0"/>
+          </a:p>
+          <a:p>
+            <a:r>
+              <a:rPr lang="en-US" sz="8000" dirty="0" smtClean="0"/>
+              <a:t>s</a:t>
+            </a:r>
+            <a:r>
+              <a:rPr lang="en-US" sz="8000" dirty="0" smtClean="0"/>
+              <a:t>helves</a:t>
+            </a:r>
+            <a:r>
+              <a:rPr lang="en-US" sz="8000" dirty="0" smtClean="0"/>
+              <a:t>.</a:t>
             </a:r>
             <a:endParaRPr lang="en-US" sz="8000" dirty="0"/>
           </a:p>
         </p:txBody>
       </p:sp>
+      <p:pic>
+        <p:nvPicPr>
+          <p:cNvPr id="13" name="Picture 12"/>
+          <p:cNvPicPr>
+            <a:picLocks noChangeAspect="1"/>
+          </p:cNvPicPr>
+          <p:nvPr/>
+        </p:nvPicPr>
+        <p:blipFill>
+          <a:blip r:embed="rId4"/>
+          <a:stretch>
+            <a:fillRect/>
+          </a:stretch>
+        </p:blipFill>
+        <p:spPr>
+          <a:xfrm>
+            <a:off x="1284927" y="16161070"/>
+            <a:ext cx="9862043" cy="6841688"/>
+          </a:xfrm>
+          <a:prstGeom prst="rect">
+            <a:avLst/>
+          </a:prstGeom>
+        </p:spPr>
+      </p:pic>
     </p:spTree>
   </p:cSld>
   <p:clrMapOvr>

</xml_diff>

<commit_message>
Add turbocat and make some adjustments
</commit_message>
<xml_diff>
--- a/Reports/DesignFairPoster/DesignFairPoster.pptx
+++ b/Reports/DesignFairPoster/DesignFairPoster.pptx
@@ -1,6 +1,6 @@
 
 <file path=ppt/presentation.xml><?xml version="1.0" encoding="utf-8"?>
-<p:presentation xmlns:a="http://schemas.openxmlformats.org/drawingml/2006/main" xmlns:r="http://schemas.openxmlformats.org/officeDocument/2006/relationships" xmlns:mc="http://schemas.openxmlformats.org/markup-compatibility/2006" xmlns:mv="urn:schemas-microsoft-com:mac:vml" xmlns:p="http://schemas.openxmlformats.org/presentationml/2006/main" mc:Ignorable="mv" mc:PreserveAttributes="mv:*" saveSubsetFonts="1" autoCompressPictures="0">
+<p:presentation xmlns:a="http://schemas.openxmlformats.org/drawingml/2006/main" xmlns:r="http://schemas.openxmlformats.org/officeDocument/2006/relationships" xmlns:p="http://schemas.openxmlformats.org/presentationml/2006/main" saveSubsetFonts="1" autoCompressPictures="0">
   <p:sldMasterIdLst>
     <p:sldMasterId id="2147483648" r:id="rId1"/>
   </p:sldMasterIdLst>
@@ -108,7 +108,7 @@
 </file>
 
 <file path=ppt/slideLayouts/slideLayout1.xml><?xml version="1.0" encoding="utf-8"?>
-<p:sldLayout xmlns:a="http://schemas.openxmlformats.org/drawingml/2006/main" xmlns:r="http://schemas.openxmlformats.org/officeDocument/2006/relationships" xmlns:mc="http://schemas.openxmlformats.org/markup-compatibility/2006" xmlns:mv="urn:schemas-microsoft-com:mac:vml" xmlns:p="http://schemas.openxmlformats.org/presentationml/2006/main" mc:Ignorable="mv" mc:PreserveAttributes="mv:*" type="title" preserve="1">
+<p:sldLayout xmlns:a="http://schemas.openxmlformats.org/drawingml/2006/main" xmlns:r="http://schemas.openxmlformats.org/officeDocument/2006/relationships" xmlns:p="http://schemas.openxmlformats.org/presentationml/2006/main" type="title" preserve="1">
   <p:cSld name="Title Slide">
     <p:spTree>
       <p:nvGrpSpPr>
@@ -289,7 +289,7 @@
             <a:fld id="{78A2E42B-BADF-1944-84F8-C0C8AAC40C07}" type="datetimeFigureOut">
               <a:rPr lang="en-US" smtClean="0"/>
               <a:pPr/>
-              <a:t>3/26/14</a:t>
+              <a:t>3/26/2014</a:t>
             </a:fld>
             <a:endParaRPr lang="en-US"/>
           </a:p>
@@ -347,7 +347,7 @@
 </file>
 
 <file path=ppt/slideLayouts/slideLayout10.xml><?xml version="1.0" encoding="utf-8"?>
-<p:sldLayout xmlns:a="http://schemas.openxmlformats.org/drawingml/2006/main" xmlns:r="http://schemas.openxmlformats.org/officeDocument/2006/relationships" xmlns:mc="http://schemas.openxmlformats.org/markup-compatibility/2006" xmlns:mv="urn:schemas-microsoft-com:mac:vml" xmlns:p="http://schemas.openxmlformats.org/presentationml/2006/main" mc:Ignorable="mv" mc:PreserveAttributes="mv:*" type="vertTx" preserve="1">
+<p:sldLayout xmlns:a="http://schemas.openxmlformats.org/drawingml/2006/main" xmlns:r="http://schemas.openxmlformats.org/officeDocument/2006/relationships" xmlns:p="http://schemas.openxmlformats.org/presentationml/2006/main" type="vertTx" preserve="1">
   <p:cSld name="Title and Vertical Text">
     <p:spTree>
       <p:nvGrpSpPr>
@@ -456,7 +456,7 @@
             <a:fld id="{78A2E42B-BADF-1944-84F8-C0C8AAC40C07}" type="datetimeFigureOut">
               <a:rPr lang="en-US" smtClean="0"/>
               <a:pPr/>
-              <a:t>3/26/14</a:t>
+              <a:t>3/26/2014</a:t>
             </a:fld>
             <a:endParaRPr lang="en-US"/>
           </a:p>
@@ -514,7 +514,7 @@
 </file>
 
 <file path=ppt/slideLayouts/slideLayout11.xml><?xml version="1.0" encoding="utf-8"?>
-<p:sldLayout xmlns:a="http://schemas.openxmlformats.org/drawingml/2006/main" xmlns:r="http://schemas.openxmlformats.org/officeDocument/2006/relationships" xmlns:mc="http://schemas.openxmlformats.org/markup-compatibility/2006" xmlns:mv="urn:schemas-microsoft-com:mac:vml" xmlns:p="http://schemas.openxmlformats.org/presentationml/2006/main" mc:Ignorable="mv" mc:PreserveAttributes="mv:*" type="vertTitleAndTx" preserve="1">
+<p:sldLayout xmlns:a="http://schemas.openxmlformats.org/drawingml/2006/main" xmlns:r="http://schemas.openxmlformats.org/officeDocument/2006/relationships" xmlns:p="http://schemas.openxmlformats.org/presentationml/2006/main" type="vertTitleAndTx" preserve="1">
   <p:cSld name="Vertical Title and Text">
     <p:spTree>
       <p:nvGrpSpPr>
@@ -633,7 +633,7 @@
             <a:fld id="{78A2E42B-BADF-1944-84F8-C0C8AAC40C07}" type="datetimeFigureOut">
               <a:rPr lang="en-US" smtClean="0"/>
               <a:pPr/>
-              <a:t>3/26/14</a:t>
+              <a:t>3/26/2014</a:t>
             </a:fld>
             <a:endParaRPr lang="en-US"/>
           </a:p>
@@ -691,7 +691,7 @@
 </file>
 
 <file path=ppt/slideLayouts/slideLayout2.xml><?xml version="1.0" encoding="utf-8"?>
-<p:sldLayout xmlns:a="http://schemas.openxmlformats.org/drawingml/2006/main" xmlns:r="http://schemas.openxmlformats.org/officeDocument/2006/relationships" xmlns:mc="http://schemas.openxmlformats.org/markup-compatibility/2006" xmlns:mv="urn:schemas-microsoft-com:mac:vml" xmlns:p="http://schemas.openxmlformats.org/presentationml/2006/main" mc:Ignorable="mv" mc:PreserveAttributes="mv:*" type="obj" preserve="1">
+<p:sldLayout xmlns:a="http://schemas.openxmlformats.org/drawingml/2006/main" xmlns:r="http://schemas.openxmlformats.org/officeDocument/2006/relationships" xmlns:p="http://schemas.openxmlformats.org/presentationml/2006/main" type="obj" preserve="1">
   <p:cSld name="Title and Content">
     <p:spTree>
       <p:nvGrpSpPr>
@@ -800,7 +800,7 @@
             <a:fld id="{78A2E42B-BADF-1944-84F8-C0C8AAC40C07}" type="datetimeFigureOut">
               <a:rPr lang="en-US" smtClean="0"/>
               <a:pPr/>
-              <a:t>3/26/14</a:t>
+              <a:t>3/26/2014</a:t>
             </a:fld>
             <a:endParaRPr lang="en-US"/>
           </a:p>
@@ -858,7 +858,7 @@
 </file>
 
 <file path=ppt/slideLayouts/slideLayout3.xml><?xml version="1.0" encoding="utf-8"?>
-<p:sldLayout xmlns:a="http://schemas.openxmlformats.org/drawingml/2006/main" xmlns:r="http://schemas.openxmlformats.org/officeDocument/2006/relationships" xmlns:mc="http://schemas.openxmlformats.org/markup-compatibility/2006" xmlns:mv="urn:schemas-microsoft-com:mac:vml" xmlns:p="http://schemas.openxmlformats.org/presentationml/2006/main" mc:Ignorable="mv" mc:PreserveAttributes="mv:*" type="secHead" preserve="1">
+<p:sldLayout xmlns:a="http://schemas.openxmlformats.org/drawingml/2006/main" xmlns:r="http://schemas.openxmlformats.org/officeDocument/2006/relationships" xmlns:p="http://schemas.openxmlformats.org/presentationml/2006/main" type="secHead" preserve="1">
   <p:cSld name="Section Header">
     <p:spTree>
       <p:nvGrpSpPr>
@@ -1043,7 +1043,7 @@
             <a:fld id="{78A2E42B-BADF-1944-84F8-C0C8AAC40C07}" type="datetimeFigureOut">
               <a:rPr lang="en-US" smtClean="0"/>
               <a:pPr/>
-              <a:t>3/26/14</a:t>
+              <a:t>3/26/2014</a:t>
             </a:fld>
             <a:endParaRPr lang="en-US"/>
           </a:p>
@@ -1101,7 +1101,7 @@
 </file>
 
 <file path=ppt/slideLayouts/slideLayout4.xml><?xml version="1.0" encoding="utf-8"?>
-<p:sldLayout xmlns:a="http://schemas.openxmlformats.org/drawingml/2006/main" xmlns:r="http://schemas.openxmlformats.org/officeDocument/2006/relationships" xmlns:mc="http://schemas.openxmlformats.org/markup-compatibility/2006" xmlns:mv="urn:schemas-microsoft-com:mac:vml" xmlns:p="http://schemas.openxmlformats.org/presentationml/2006/main" mc:Ignorable="mv" mc:PreserveAttributes="mv:*" type="twoObj" preserve="1">
+<p:sldLayout xmlns:a="http://schemas.openxmlformats.org/drawingml/2006/main" xmlns:r="http://schemas.openxmlformats.org/officeDocument/2006/relationships" xmlns:p="http://schemas.openxmlformats.org/presentationml/2006/main" type="twoObj" preserve="1">
   <p:cSld name="Two Content">
     <p:spTree>
       <p:nvGrpSpPr>
@@ -1328,7 +1328,7 @@
             <a:fld id="{78A2E42B-BADF-1944-84F8-C0C8AAC40C07}" type="datetimeFigureOut">
               <a:rPr lang="en-US" smtClean="0"/>
               <a:pPr/>
-              <a:t>3/26/14</a:t>
+              <a:t>3/26/2014</a:t>
             </a:fld>
             <a:endParaRPr lang="en-US"/>
           </a:p>
@@ -1386,7 +1386,7 @@
 </file>
 
 <file path=ppt/slideLayouts/slideLayout5.xml><?xml version="1.0" encoding="utf-8"?>
-<p:sldLayout xmlns:a="http://schemas.openxmlformats.org/drawingml/2006/main" xmlns:r="http://schemas.openxmlformats.org/officeDocument/2006/relationships" xmlns:mc="http://schemas.openxmlformats.org/markup-compatibility/2006" xmlns:mv="urn:schemas-microsoft-com:mac:vml" xmlns:p="http://schemas.openxmlformats.org/presentationml/2006/main" mc:Ignorable="mv" mc:PreserveAttributes="mv:*" type="twoTxTwoObj" preserve="1">
+<p:sldLayout xmlns:a="http://schemas.openxmlformats.org/drawingml/2006/main" xmlns:r="http://schemas.openxmlformats.org/officeDocument/2006/relationships" xmlns:p="http://schemas.openxmlformats.org/presentationml/2006/main" type="twoTxTwoObj" preserve="1">
   <p:cSld name="Comparison">
     <p:spTree>
       <p:nvGrpSpPr>
@@ -1747,7 +1747,7 @@
             <a:fld id="{78A2E42B-BADF-1944-84F8-C0C8AAC40C07}" type="datetimeFigureOut">
               <a:rPr lang="en-US" smtClean="0"/>
               <a:pPr/>
-              <a:t>3/26/14</a:t>
+              <a:t>3/26/2014</a:t>
             </a:fld>
             <a:endParaRPr lang="en-US"/>
           </a:p>
@@ -1805,7 +1805,7 @@
 </file>
 
 <file path=ppt/slideLayouts/slideLayout6.xml><?xml version="1.0" encoding="utf-8"?>
-<p:sldLayout xmlns:a="http://schemas.openxmlformats.org/drawingml/2006/main" xmlns:r="http://schemas.openxmlformats.org/officeDocument/2006/relationships" xmlns:mc="http://schemas.openxmlformats.org/markup-compatibility/2006" xmlns:mv="urn:schemas-microsoft-com:mac:vml" xmlns:p="http://schemas.openxmlformats.org/presentationml/2006/main" mc:Ignorable="mv" mc:PreserveAttributes="mv:*" type="titleOnly" preserve="1">
+<p:sldLayout xmlns:a="http://schemas.openxmlformats.org/drawingml/2006/main" xmlns:r="http://schemas.openxmlformats.org/officeDocument/2006/relationships" xmlns:p="http://schemas.openxmlformats.org/presentationml/2006/main" type="titleOnly" preserve="1">
   <p:cSld name="Title Only">
     <p:spTree>
       <p:nvGrpSpPr>
@@ -1862,7 +1862,7 @@
             <a:fld id="{78A2E42B-BADF-1944-84F8-C0C8AAC40C07}" type="datetimeFigureOut">
               <a:rPr lang="en-US" smtClean="0"/>
               <a:pPr/>
-              <a:t>3/26/14</a:t>
+              <a:t>3/26/2014</a:t>
             </a:fld>
             <a:endParaRPr lang="en-US"/>
           </a:p>
@@ -1920,7 +1920,7 @@
 </file>
 
 <file path=ppt/slideLayouts/slideLayout7.xml><?xml version="1.0" encoding="utf-8"?>
-<p:sldLayout xmlns:a="http://schemas.openxmlformats.org/drawingml/2006/main" xmlns:r="http://schemas.openxmlformats.org/officeDocument/2006/relationships" xmlns:mc="http://schemas.openxmlformats.org/markup-compatibility/2006" xmlns:mv="urn:schemas-microsoft-com:mac:vml" xmlns:p="http://schemas.openxmlformats.org/presentationml/2006/main" mc:Ignorable="mv" mc:PreserveAttributes="mv:*" type="blank" preserve="1">
+<p:sldLayout xmlns:a="http://schemas.openxmlformats.org/drawingml/2006/main" xmlns:r="http://schemas.openxmlformats.org/officeDocument/2006/relationships" xmlns:p="http://schemas.openxmlformats.org/presentationml/2006/main" type="blank" preserve="1">
   <p:cSld name="Blank">
     <p:spTree>
       <p:nvGrpSpPr>
@@ -1954,7 +1954,7 @@
             <a:fld id="{78A2E42B-BADF-1944-84F8-C0C8AAC40C07}" type="datetimeFigureOut">
               <a:rPr lang="en-US" smtClean="0"/>
               <a:pPr/>
-              <a:t>3/26/14</a:t>
+              <a:t>3/26/2014</a:t>
             </a:fld>
             <a:endParaRPr lang="en-US"/>
           </a:p>
@@ -2012,7 +2012,7 @@
 </file>
 
 <file path=ppt/slideLayouts/slideLayout8.xml><?xml version="1.0" encoding="utf-8"?>
-<p:sldLayout xmlns:a="http://schemas.openxmlformats.org/drawingml/2006/main" xmlns:r="http://schemas.openxmlformats.org/officeDocument/2006/relationships" xmlns:mc="http://schemas.openxmlformats.org/markup-compatibility/2006" xmlns:mv="urn:schemas-microsoft-com:mac:vml" xmlns:p="http://schemas.openxmlformats.org/presentationml/2006/main" mc:Ignorable="mv" mc:PreserveAttributes="mv:*" type="objTx" preserve="1">
+<p:sldLayout xmlns:a="http://schemas.openxmlformats.org/drawingml/2006/main" xmlns:r="http://schemas.openxmlformats.org/officeDocument/2006/relationships" xmlns:p="http://schemas.openxmlformats.org/presentationml/2006/main" type="objTx" preserve="1">
   <p:cSld name="Content with Caption">
     <p:spTree>
       <p:nvGrpSpPr>
@@ -2228,7 +2228,7 @@
             <a:fld id="{78A2E42B-BADF-1944-84F8-C0C8AAC40C07}" type="datetimeFigureOut">
               <a:rPr lang="en-US" smtClean="0"/>
               <a:pPr/>
-              <a:t>3/26/14</a:t>
+              <a:t>3/26/2014</a:t>
             </a:fld>
             <a:endParaRPr lang="en-US"/>
           </a:p>
@@ -2286,7 +2286,7 @@
 </file>
 
 <file path=ppt/slideLayouts/slideLayout9.xml><?xml version="1.0" encoding="utf-8"?>
-<p:sldLayout xmlns:a="http://schemas.openxmlformats.org/drawingml/2006/main" xmlns:r="http://schemas.openxmlformats.org/officeDocument/2006/relationships" xmlns:mc="http://schemas.openxmlformats.org/markup-compatibility/2006" xmlns:mv="urn:schemas-microsoft-com:mac:vml" xmlns:p="http://schemas.openxmlformats.org/presentationml/2006/main" mc:Ignorable="mv" mc:PreserveAttributes="mv:*" type="picTx" preserve="1">
+<p:sldLayout xmlns:a="http://schemas.openxmlformats.org/drawingml/2006/main" xmlns:r="http://schemas.openxmlformats.org/officeDocument/2006/relationships" xmlns:p="http://schemas.openxmlformats.org/presentationml/2006/main" type="picTx" preserve="1">
   <p:cSld name="Picture with Caption">
     <p:spTree>
       <p:nvGrpSpPr>
@@ -2478,7 +2478,7 @@
             <a:fld id="{78A2E42B-BADF-1944-84F8-C0C8AAC40C07}" type="datetimeFigureOut">
               <a:rPr lang="en-US" smtClean="0"/>
               <a:pPr/>
-              <a:t>3/26/14</a:t>
+              <a:t>3/26/2014</a:t>
             </a:fld>
             <a:endParaRPr lang="en-US"/>
           </a:p>
@@ -2536,12 +2536,15 @@
 </file>
 
 <file path=ppt/slideMasters/slideMaster1.xml><?xml version="1.0" encoding="utf-8"?>
-<p:sldMaster xmlns:a="http://schemas.openxmlformats.org/drawingml/2006/main" xmlns:r="http://schemas.openxmlformats.org/officeDocument/2006/relationships" xmlns:mc="http://schemas.openxmlformats.org/markup-compatibility/2006" xmlns:mv="urn:schemas-microsoft-com:mac:vml" xmlns:p="http://schemas.openxmlformats.org/presentationml/2006/main" mc:Ignorable="mv" mc:PreserveAttributes="mv:*">
+<p:sldMaster xmlns:a="http://schemas.openxmlformats.org/drawingml/2006/main" xmlns:r="http://schemas.openxmlformats.org/officeDocument/2006/relationships" xmlns:p="http://schemas.openxmlformats.org/presentationml/2006/main">
   <p:cSld>
     <p:bg>
-      <p:bgRef idx="1003">
-        <a:schemeClr val="bg1"/>
-      </p:bgRef>
+      <p:bgPr>
+        <a:solidFill>
+          <a:schemeClr val="bg1"/>
+        </a:solidFill>
+        <a:effectLst/>
+      </p:bgPr>
     </p:bg>
     <p:spTree>
       <p:nvGrpSpPr>
@@ -2688,7 +2691,7 @@
             <a:fld id="{78A2E42B-BADF-1944-84F8-C0C8AAC40C07}" type="datetimeFigureOut">
               <a:rPr lang="en-US" smtClean="0"/>
               <a:pPr/>
-              <a:t>3/26/14</a:t>
+              <a:t>3/26/2014</a:t>
             </a:fld>
             <a:endParaRPr lang="en-US"/>
           </a:p>
@@ -3043,7 +3046,7 @@
 </file>
 
 <file path=ppt/slides/slide1.xml><?xml version="1.0" encoding="utf-8"?>
-<p:sld xmlns:a="http://schemas.openxmlformats.org/drawingml/2006/main" xmlns:r="http://schemas.openxmlformats.org/officeDocument/2006/relationships" xmlns:mc="http://schemas.openxmlformats.org/markup-compatibility/2006" xmlns:mv="urn:schemas-microsoft-com:mac:vml" xmlns:p="http://schemas.openxmlformats.org/presentationml/2006/main" mc:Ignorable="mv" mc:PreserveAttributes="mv:*">
+<p:sld xmlns:a="http://schemas.openxmlformats.org/drawingml/2006/main" xmlns:r="http://schemas.openxmlformats.org/officeDocument/2006/relationships" xmlns:p="http://schemas.openxmlformats.org/presentationml/2006/main">
   <p:cSld>
     <p:spTree>
       <p:nvGrpSpPr>
@@ -3061,65 +3064,129 @@
       </p:grpSpPr>
       <p:sp>
         <p:nvSpPr>
-          <p:cNvPr id="4" name="Title 3"/>
-          <p:cNvSpPr>
-            <a:spLocks noGrp="1"/>
-          </p:cNvSpPr>
-          <p:nvPr>
-            <p:ph type="title"/>
-          </p:nvPr>
-        </p:nvSpPr>
-        <p:spPr/>
-        <p:txBody>
-          <a:bodyPr/>
-          <a:lstStyle/>
-          <a:p>
-            <a:r>
-              <a:rPr lang="en-US" dirty="0" smtClean="0"/>
-              <a:t>LASS: Location Aware Shelf System</a:t>
-            </a:r>
-            <a:endParaRPr lang="en-US" dirty="0"/>
-          </a:p>
-        </p:txBody>
-      </p:sp>
-      <p:sp>
-        <p:nvSpPr>
-          <p:cNvPr id="5" name="Content Placeholder 4"/>
-          <p:cNvSpPr>
-            <a:spLocks noGrp="1"/>
-          </p:cNvSpPr>
-          <p:nvPr>
-            <p:ph sz="half" idx="1"/>
-          </p:nvPr>
+          <p:cNvPr id="16" name="Rectangle 15"/>
+          <p:cNvSpPr/>
+          <p:nvPr/>
         </p:nvSpPr>
         <p:spPr>
           <a:xfrm>
-            <a:off x="16485401" y="28149397"/>
-            <a:ext cx="17558464" cy="3803895"/>
+            <a:off x="13955489" y="6137877"/>
+            <a:ext cx="28155037" cy="24970737"/>
+          </a:xfrm>
+          <a:prstGeom prst="rect">
+            <a:avLst/>
+          </a:prstGeom>
+          <a:solidFill>
+            <a:schemeClr val="bg1">
+              <a:lumMod val="95000"/>
+            </a:schemeClr>
+          </a:solidFill>
+          <a:ln>
+            <a:noFill/>
+          </a:ln>
+        </p:spPr>
+        <p:style>
+          <a:lnRef idx="1">
+            <a:schemeClr val="accent1"/>
+          </a:lnRef>
+          <a:fillRef idx="3">
+            <a:schemeClr val="accent1"/>
+          </a:fillRef>
+          <a:effectRef idx="2">
+            <a:schemeClr val="accent1"/>
+          </a:effectRef>
+          <a:fontRef idx="minor">
+            <a:schemeClr val="lt1"/>
+          </a:fontRef>
+        </p:style>
+        <p:txBody>
+          <a:bodyPr rtlCol="0" anchor="ctr"/>
+          <a:lstStyle/>
+          <a:p>
+            <a:pPr algn="ctr"/>
+            <a:endParaRPr lang="en-CA"/>
+          </a:p>
+        </p:txBody>
+      </p:sp>
+      <p:sp>
+        <p:nvSpPr>
+          <p:cNvPr id="6" name="Rectangle 5"/>
+          <p:cNvSpPr/>
+          <p:nvPr/>
+        </p:nvSpPr>
+        <p:spPr>
+          <a:xfrm>
+            <a:off x="1915967" y="6137878"/>
+            <a:ext cx="10552759" cy="24970737"/>
+          </a:xfrm>
+          <a:prstGeom prst="rect">
+            <a:avLst/>
+          </a:prstGeom>
+          <a:solidFill>
+            <a:schemeClr val="bg1">
+              <a:lumMod val="85000"/>
+            </a:schemeClr>
+          </a:solidFill>
+          <a:ln>
+            <a:noFill/>
+          </a:ln>
+        </p:spPr>
+        <p:style>
+          <a:lnRef idx="1">
+            <a:schemeClr val="accent1"/>
+          </a:lnRef>
+          <a:fillRef idx="3">
+            <a:schemeClr val="accent1"/>
+          </a:fillRef>
+          <a:effectRef idx="2">
+            <a:schemeClr val="accent1"/>
+          </a:effectRef>
+          <a:fontRef idx="minor">
+            <a:schemeClr val="lt1"/>
+          </a:fontRef>
+        </p:style>
+        <p:txBody>
+          <a:bodyPr rtlCol="0" anchor="ctr"/>
+          <a:lstStyle/>
+          <a:p>
+            <a:pPr algn="ctr"/>
+            <a:endParaRPr lang="en-CA"/>
+          </a:p>
+        </p:txBody>
+      </p:sp>
+      <p:sp>
+        <p:nvSpPr>
+          <p:cNvPr id="4" name="Title 3"/>
+          <p:cNvSpPr>
+            <a:spLocks noGrp="1"/>
+          </p:cNvSpPr>
+          <p:nvPr>
+            <p:ph type="title"/>
+          </p:nvPr>
+        </p:nvSpPr>
+        <p:spPr>
+          <a:xfrm>
+            <a:off x="1491915" y="933252"/>
+            <a:ext cx="41244253" cy="3109359"/>
           </a:xfrm>
         </p:spPr>
         <p:txBody>
           <a:bodyPr>
-            <a:normAutofit/>
+            <a:normAutofit fontScale="90000"/>
           </a:bodyPr>
           <a:lstStyle/>
           <a:p>
-            <a:pPr>
-              <a:buNone/>
-            </a:pPr>
-            <a:r>
-              <a:rPr lang="en-US" sz="6000" b="1" dirty="0" smtClean="0"/>
-              <a:t>         This Project </a:t>
-            </a:r>
-            <a:r>
-              <a:rPr lang="en-US" sz="6000" dirty="0" smtClean="0"/>
-              <a:t>hopes to serve as a stand alon</a:t>
-            </a:r>
-            <a:r>
-              <a:rPr lang="en-US" sz="6000" dirty="0" smtClean="0"/>
-              <a:t>e product that be hacked or improved upon for a variety of different applications. </a:t>
-            </a:r>
-            <a:endParaRPr lang="en-US" sz="6000" b="1" dirty="0"/>
+            <a:r>
+              <a:rPr lang="en-US" sz="18400" dirty="0" smtClean="0">
+                <a:latin typeface="Gulim" panose="020B0600000101010101" pitchFamily="34" charset="-127"/>
+                <a:ea typeface="Gulim" panose="020B0600000101010101" pitchFamily="34" charset="-127"/>
+              </a:rPr>
+              <a:t>LASS: Location Aware Shelf System</a:t>
+            </a:r>
+            <a:endParaRPr lang="en-US" sz="18400" dirty="0">
+              <a:latin typeface="Gulim" panose="020B0600000101010101" pitchFamily="34" charset="-127"/>
+              <a:ea typeface="Gulim" panose="020B0600000101010101" pitchFamily="34" charset="-127"/>
+            </a:endParaRPr>
           </a:p>
         </p:txBody>
       </p:sp>
@@ -3139,7 +3206,7 @@
         </p:blipFill>
         <p:spPr>
           <a:xfrm>
-            <a:off x="38771757" y="25548255"/>
+            <a:off x="37267148" y="23788736"/>
             <a:ext cx="4699000" cy="7175500"/>
           </a:xfrm>
           <a:prstGeom prst="rect">
@@ -3155,8 +3222,8 @@
         </p:nvSpPr>
         <p:spPr>
           <a:xfrm>
-            <a:off x="2194560" y="8128102"/>
-            <a:ext cx="14290841" cy="5632311"/>
+            <a:off x="2468126" y="6593305"/>
+            <a:ext cx="9448440" cy="8402300"/>
           </a:xfrm>
           <a:prstGeom prst="rect">
             <a:avLst/>
@@ -3164,62 +3231,56 @@
           <a:noFill/>
         </p:spPr>
         <p:txBody>
-          <a:bodyPr wrap="none" rtlCol="0">
+          <a:bodyPr wrap="square" rtlCol="0">
             <a:spAutoFit/>
           </a:bodyPr>
           <a:lstStyle/>
           <a:p>
             <a:r>
-              <a:rPr lang="en-US" sz="6000" b="1" dirty="0" smtClean="0"/>
+              <a:rPr lang="en-US" sz="5400" b="1" dirty="0" smtClean="0">
+                <a:latin typeface="Fira Sans Light" panose="020B0603050000020004" pitchFamily="34" charset="0"/>
+                <a:ea typeface="Fira Sans Light" panose="020B0603050000020004" pitchFamily="34" charset="0"/>
+                <a:cs typeface="Segoe UI" panose="020B0502040204020203" pitchFamily="34" charset="0"/>
+              </a:rPr>
               <a:t>Internet of Things (</a:t>
             </a:r>
             <a:r>
-              <a:rPr lang="en-US" sz="6000" b="1" dirty="0" err="1" smtClean="0"/>
+              <a:rPr lang="en-US" sz="5400" b="1" dirty="0" err="1" smtClean="0">
+                <a:latin typeface="Fira Sans Light" panose="020B0603050000020004" pitchFamily="34" charset="0"/>
+                <a:ea typeface="Fira Sans Light" panose="020B0603050000020004" pitchFamily="34" charset="0"/>
+                <a:cs typeface="Segoe UI" panose="020B0502040204020203" pitchFamily="34" charset="0"/>
+              </a:rPr>
               <a:t>IoT</a:t>
             </a:r>
             <a:r>
-              <a:rPr lang="en-US" sz="6000" b="1" dirty="0" smtClean="0"/>
+              <a:rPr lang="en-US" sz="5400" b="1" dirty="0" smtClean="0">
+                <a:latin typeface="Fira Sans Light" panose="020B0603050000020004" pitchFamily="34" charset="0"/>
+                <a:ea typeface="Fira Sans Light" panose="020B0603050000020004" pitchFamily="34" charset="0"/>
+                <a:cs typeface="Segoe UI" panose="020B0502040204020203" pitchFamily="34" charset="0"/>
+              </a:rPr>
               <a:t>) </a:t>
             </a:r>
             <a:r>
-              <a:rPr lang="en-US" sz="6000" dirty="0" smtClean="0"/>
-              <a:t>is a scenario in which</a:t>
-            </a:r>
-          </a:p>
-          <a:p>
-            <a:r>
-              <a:rPr lang="en-US" sz="6000" dirty="0" smtClean="0"/>
-              <a:t>objects, animals or people are provided with </a:t>
-            </a:r>
-          </a:p>
-          <a:p>
-            <a:r>
-              <a:rPr lang="en-US" sz="6000" dirty="0" smtClean="0"/>
-              <a:t>unique identifiers and the ability to </a:t>
-            </a:r>
-          </a:p>
-          <a:p>
-            <a:r>
-              <a:rPr lang="en-US" sz="6000" dirty="0" smtClean="0"/>
-              <a:t>automatically transfer data over a network </a:t>
-            </a:r>
-          </a:p>
-          <a:p>
-            <a:r>
-              <a:rPr lang="en-US" sz="6000" dirty="0" smtClean="0"/>
-              <a:t>without requiring human-to-human or </a:t>
-            </a:r>
-          </a:p>
-          <a:p>
-            <a:r>
-              <a:rPr lang="en-US" sz="6000" dirty="0" smtClean="0"/>
-              <a:t>human-to-computer interaction. </a:t>
-            </a:r>
-            <a:r>
-              <a:rPr lang="en-US" sz="6000" b="1" dirty="0" smtClean="0"/>
+              <a:rPr lang="en-US" sz="5400" dirty="0" smtClean="0">
+                <a:latin typeface="Fira Sans Light" panose="020B0603050000020004" pitchFamily="34" charset="0"/>
+                <a:ea typeface="Fira Sans Light" panose="020B0603050000020004" pitchFamily="34" charset="0"/>
+                <a:cs typeface="Segoe UI" panose="020B0502040204020203" pitchFamily="34" charset="0"/>
+              </a:rPr>
+              <a:t>is a scenario in which objects, animals or people are provided with unique identifiers and the ability to automatically transfer data over a network without requiring human-to-human or human-to-computer interaction. </a:t>
+            </a:r>
+            <a:r>
+              <a:rPr lang="en-US" sz="5400" b="1" dirty="0" smtClean="0">
+                <a:latin typeface="Fira Sans Light" panose="020B0603050000020004" pitchFamily="34" charset="0"/>
+                <a:ea typeface="Fira Sans Light" panose="020B0603050000020004" pitchFamily="34" charset="0"/>
+                <a:cs typeface="Segoe UI" panose="020B0502040204020203" pitchFamily="34" charset="0"/>
+              </a:rPr>
               <a:t> </a:t>
             </a:r>
-            <a:endParaRPr lang="en-US" sz="6000" b="1" dirty="0"/>
+            <a:endParaRPr lang="en-US" sz="5400" b="1" dirty="0">
+              <a:latin typeface="Fira Sans Light" panose="020B0603050000020004" pitchFamily="34" charset="0"/>
+              <a:ea typeface="Fira Sans Light" panose="020B0603050000020004" pitchFamily="34" charset="0"/>
+              <a:cs typeface="Segoe UI" panose="020B0502040204020203" pitchFamily="34" charset="0"/>
+            </a:endParaRPr>
           </a:p>
         </p:txBody>
       </p:sp>
@@ -3231,8 +3292,8 @@
         </p:nvSpPr>
         <p:spPr>
           <a:xfrm>
-            <a:off x="19774284" y="6804663"/>
-            <a:ext cx="15006333" cy="6955750"/>
+            <a:off x="2465563" y="23053729"/>
+            <a:ext cx="9419065" cy="7571303"/>
           </a:xfrm>
           <a:prstGeom prst="rect">
             <a:avLst/>
@@ -3246,52 +3307,190 @@
           <a:lstStyle/>
           <a:p>
             <a:r>
-              <a:rPr lang="en-US" sz="6000" b="1" dirty="0" smtClean="0"/>
+              <a:rPr lang="en-US" sz="5400" b="1" dirty="0" smtClean="0">
+                <a:latin typeface="Fira Sans Light" panose="020B0603050000020004" pitchFamily="34" charset="0"/>
+                <a:ea typeface="Fira Sans Light" panose="020B0603050000020004" pitchFamily="34" charset="0"/>
+              </a:rPr>
               <a:t>Open Geospatial Consortium (OGC) </a:t>
             </a:r>
             <a:r>
-              <a:rPr lang="en-US" sz="6000" dirty="0" smtClean="0"/>
+              <a:rPr lang="en-US" sz="5400" dirty="0" smtClean="0">
+                <a:latin typeface="Fira Sans Light" panose="020B0603050000020004" pitchFamily="34" charset="0"/>
+                <a:ea typeface="Fira Sans Light" panose="020B0603050000020004" pitchFamily="34" charset="0"/>
+              </a:rPr>
               <a:t>is an </a:t>
             </a:r>
-          </a:p>
-          <a:p>
-            <a:r>
-              <a:rPr lang="en-US" sz="6000" dirty="0" smtClean="0"/>
-              <a:t>international industry consortium of 472</a:t>
-            </a:r>
-          </a:p>
-          <a:p>
-            <a:r>
-              <a:rPr lang="en-US" sz="6000" dirty="0" smtClean="0"/>
-              <a:t>companies, government agencies and </a:t>
-            </a:r>
-          </a:p>
-          <a:p>
-            <a:r>
-              <a:rPr lang="en-US" sz="6000" dirty="0" smtClean="0"/>
-              <a:t>universities participating in a consensus </a:t>
-            </a:r>
-          </a:p>
-          <a:p>
-            <a:r>
-              <a:rPr lang="en-US" sz="6000" dirty="0" smtClean="0"/>
+            <a:r>
+              <a:rPr lang="en-US" sz="5400" dirty="0" smtClean="0">
+                <a:latin typeface="Fira Sans Light" panose="020B0603050000020004" pitchFamily="34" charset="0"/>
+                <a:ea typeface="Fira Sans Light" panose="020B0603050000020004" pitchFamily="34" charset="0"/>
+              </a:rPr>
+              <a:t>international </a:t>
+            </a:r>
+            <a:r>
+              <a:rPr lang="en-US" sz="5400" dirty="0" smtClean="0">
+                <a:latin typeface="Fira Sans Light" panose="020B0603050000020004" pitchFamily="34" charset="0"/>
+                <a:ea typeface="Fira Sans Light" panose="020B0603050000020004" pitchFamily="34" charset="0"/>
+              </a:rPr>
+              <a:t>industry consortium of </a:t>
+            </a:r>
+            <a:r>
+              <a:rPr lang="en-US" sz="5400" dirty="0" smtClean="0">
+                <a:latin typeface="Fira Sans Light" panose="020B0603050000020004" pitchFamily="34" charset="0"/>
+                <a:ea typeface="Fira Sans Light" panose="020B0603050000020004" pitchFamily="34" charset="0"/>
+              </a:rPr>
+              <a:t>472 companies</a:t>
+            </a:r>
+            <a:r>
+              <a:rPr lang="en-US" sz="5400" dirty="0" smtClean="0">
+                <a:latin typeface="Fira Sans Light" panose="020B0603050000020004" pitchFamily="34" charset="0"/>
+                <a:ea typeface="Fira Sans Light" panose="020B0603050000020004" pitchFamily="34" charset="0"/>
+              </a:rPr>
+              <a:t>, government agencies and </a:t>
+            </a:r>
+            <a:r>
+              <a:rPr lang="en-US" sz="5400" dirty="0" smtClean="0">
+                <a:latin typeface="Fira Sans Light" panose="020B0603050000020004" pitchFamily="34" charset="0"/>
+                <a:ea typeface="Fira Sans Light" panose="020B0603050000020004" pitchFamily="34" charset="0"/>
+              </a:rPr>
+              <a:t>universities </a:t>
+            </a:r>
+            <a:r>
+              <a:rPr lang="en-US" sz="5400" dirty="0" smtClean="0">
+                <a:latin typeface="Fira Sans Light" panose="020B0603050000020004" pitchFamily="34" charset="0"/>
+                <a:ea typeface="Fira Sans Light" panose="020B0603050000020004" pitchFamily="34" charset="0"/>
+              </a:rPr>
+              <a:t>participating in a consensus </a:t>
+            </a:r>
+          </a:p>
+          <a:p>
+            <a:r>
+              <a:rPr lang="en-US" sz="5400" dirty="0" smtClean="0">
+                <a:latin typeface="Fira Sans Light" panose="020B0603050000020004" pitchFamily="34" charset="0"/>
+                <a:ea typeface="Fira Sans Light" panose="020B0603050000020004" pitchFamily="34" charset="0"/>
+              </a:rPr>
               <a:t>process to develop publicly available </a:t>
             </a:r>
-          </a:p>
-          <a:p>
-            <a:r>
-              <a:rPr lang="en-US" sz="6000" dirty="0" smtClean="0"/>
-              <a:t>interface standards. </a:t>
-            </a:r>
-          </a:p>
-          <a:p>
-            <a:endParaRPr lang="en-US" dirty="0"/>
+            <a:r>
+              <a:rPr lang="en-US" sz="5400" dirty="0" smtClean="0">
+                <a:latin typeface="Fira Sans Light" panose="020B0603050000020004" pitchFamily="34" charset="0"/>
+                <a:ea typeface="Fira Sans Light" panose="020B0603050000020004" pitchFamily="34" charset="0"/>
+              </a:rPr>
+              <a:t>interface </a:t>
+            </a:r>
+            <a:r>
+              <a:rPr lang="en-US" sz="5400" dirty="0" smtClean="0">
+                <a:latin typeface="Fira Sans Light" panose="020B0603050000020004" pitchFamily="34" charset="0"/>
+                <a:ea typeface="Fira Sans Light" panose="020B0603050000020004" pitchFamily="34" charset="0"/>
+              </a:rPr>
+              <a:t>standards. </a:t>
+            </a:r>
+          </a:p>
+          <a:p>
+            <a:endParaRPr lang="en-US" sz="5400" dirty="0">
+              <a:latin typeface="Fira Sans Light" panose="020B0603050000020004" pitchFamily="34" charset="0"/>
+              <a:ea typeface="Fira Sans Light" panose="020B0603050000020004" pitchFamily="34" charset="0"/>
+            </a:endParaRPr>
+          </a:p>
+        </p:txBody>
+      </p:sp>
+      <p:sp>
+        <p:nvSpPr>
+          <p:cNvPr id="12" name="TextBox 11"/>
+          <p:cNvSpPr txBox="1"/>
+          <p:nvPr/>
+        </p:nvSpPr>
+        <p:spPr>
+          <a:xfrm>
+            <a:off x="14466323" y="9049281"/>
+            <a:ext cx="9019319" cy="6555641"/>
+          </a:xfrm>
+          <a:prstGeom prst="rect">
+            <a:avLst/>
+          </a:prstGeom>
+          <a:noFill/>
+        </p:spPr>
+        <p:txBody>
+          <a:bodyPr wrap="square" rtlCol="0">
+            <a:spAutoFit/>
+          </a:bodyPr>
+          <a:lstStyle/>
+          <a:p>
+            <a:r>
+              <a:rPr lang="en-US" sz="6000" b="1" dirty="0" smtClean="0">
+                <a:latin typeface="Fira Sans" panose="020B0603050000020004" pitchFamily="34" charset="0"/>
+              </a:rPr>
+              <a:t>The </a:t>
+            </a:r>
+            <a:r>
+              <a:rPr lang="en-US" sz="6000" b="1" dirty="0" smtClean="0">
+                <a:latin typeface="Fira Sans" panose="020B0603050000020004" pitchFamily="34" charset="0"/>
+              </a:rPr>
+              <a:t>sensor / hardware </a:t>
+            </a:r>
+            <a:r>
+              <a:rPr lang="en-US" sz="6000" b="1" dirty="0" smtClean="0">
+                <a:latin typeface="Fira Sans" panose="020B0603050000020004" pitchFamily="34" charset="0"/>
+              </a:rPr>
+              <a:t>component</a:t>
+            </a:r>
+            <a:r>
+              <a:rPr lang="en-US" sz="6000" dirty="0" smtClean="0">
+                <a:latin typeface="Fira Sans" panose="020B0603050000020004" pitchFamily="34" charset="0"/>
+              </a:rPr>
+              <a:t> deals </a:t>
+            </a:r>
+            <a:r>
+              <a:rPr lang="en-US" sz="6000" dirty="0" smtClean="0">
+                <a:latin typeface="Fira Sans" panose="020B0603050000020004" pitchFamily="34" charset="0"/>
+              </a:rPr>
+              <a:t>with the development of a prototype </a:t>
+            </a:r>
+            <a:r>
+              <a:rPr lang="en-US" sz="6000" dirty="0" smtClean="0">
+                <a:latin typeface="Fira Sans" panose="020B0603050000020004" pitchFamily="34" charset="0"/>
+              </a:rPr>
+              <a:t>smart </a:t>
+            </a:r>
+            <a:r>
+              <a:rPr lang="en-US" sz="6000" dirty="0" smtClean="0">
+                <a:latin typeface="Fira Sans" panose="020B0603050000020004" pitchFamily="34" charset="0"/>
+              </a:rPr>
+              <a:t>shelf that can update sensor </a:t>
+            </a:r>
+            <a:r>
+              <a:rPr lang="en-US" sz="6000" dirty="0" smtClean="0">
+                <a:latin typeface="Fira Sans" panose="020B0603050000020004" pitchFamily="34" charset="0"/>
+              </a:rPr>
+              <a:t>readings to </a:t>
+            </a:r>
+            <a:r>
+              <a:rPr lang="en-US" sz="6000" dirty="0" smtClean="0">
+                <a:latin typeface="Fira Sans" panose="020B0603050000020004" pitchFamily="34" charset="0"/>
+              </a:rPr>
+              <a:t>OGC </a:t>
+            </a:r>
+            <a:r>
+              <a:rPr lang="en-US" sz="6000" dirty="0" err="1" smtClean="0">
+                <a:latin typeface="Fira Sans" panose="020B0603050000020004" pitchFamily="34" charset="0"/>
+              </a:rPr>
+              <a:t>SensorThings</a:t>
+            </a:r>
+            <a:r>
+              <a:rPr lang="en-US" sz="6000" dirty="0" smtClean="0">
+                <a:latin typeface="Fira Sans" panose="020B0603050000020004" pitchFamily="34" charset="0"/>
+              </a:rPr>
+              <a:t> API.</a:t>
+            </a:r>
+            <a:endParaRPr lang="en-US" sz="6000" dirty="0">
+              <a:latin typeface="Fira Sans" panose="020B0603050000020004" pitchFamily="34" charset="0"/>
+            </a:endParaRPr>
           </a:p>
         </p:txBody>
       </p:sp>
       <p:pic>
         <p:nvPicPr>
-          <p:cNvPr id="11" name="Picture 10"/>
+          <p:cNvPr id="13" name="Picture 12"/>
           <p:cNvPicPr>
             <a:picLocks noChangeAspect="1"/>
           </p:cNvPicPr>
@@ -3305,8 +3504,8 @@
         </p:blipFill>
         <p:spPr>
           <a:xfrm>
-            <a:off x="2194559" y="5533648"/>
-            <a:ext cx="6596069" cy="2594454"/>
+            <a:off x="2465563" y="15528793"/>
+            <a:ext cx="9421628" cy="6670166"/>
           </a:xfrm>
           <a:prstGeom prst="rect">
             <a:avLst/>
@@ -3315,14 +3514,14 @@
       </p:pic>
       <p:sp>
         <p:nvSpPr>
-          <p:cNvPr id="12" name="TextBox 11"/>
+          <p:cNvPr id="14" name="TextBox 13"/>
           <p:cNvSpPr txBox="1"/>
           <p:nvPr/>
         </p:nvSpPr>
         <p:spPr>
           <a:xfrm>
-            <a:off x="20768942" y="20578093"/>
-            <a:ext cx="19363970" cy="3785652"/>
+            <a:off x="14466323" y="26770854"/>
+            <a:ext cx="22332511" cy="2862322"/>
           </a:xfrm>
           <a:prstGeom prst="rect">
             <a:avLst/>
@@ -3330,99 +3529,247 @@
           <a:noFill/>
         </p:spPr>
         <p:txBody>
-          <a:bodyPr wrap="none" rtlCol="0">
+          <a:bodyPr wrap="square" rtlCol="0">
             <a:spAutoFit/>
           </a:bodyPr>
           <a:lstStyle/>
           <a:p>
             <a:r>
-              <a:rPr lang="en-US" sz="6000" b="1" dirty="0" smtClean="0"/>
-              <a:t>One major aspect </a:t>
-            </a:r>
-            <a:r>
-              <a:rPr lang="en-US" sz="6000" dirty="0" smtClean="0"/>
-              <a:t>of the project is the </a:t>
-            </a:r>
-            <a:r>
-              <a:rPr lang="en-US" sz="6000" dirty="0" smtClean="0"/>
+              <a:rPr lang="en-US" sz="6000" b="1" dirty="0" smtClean="0">
+                <a:latin typeface="Fira Sans" panose="020B0603050000020004" pitchFamily="34" charset="0"/>
+              </a:rPr>
+              <a:t>This project </a:t>
+            </a:r>
+            <a:r>
+              <a:rPr lang="en-US" sz="6000" dirty="0" smtClean="0">
+                <a:latin typeface="Fira Sans" panose="020B0603050000020004" pitchFamily="34" charset="0"/>
+              </a:rPr>
+              <a:t>will be developed as a Free, Open-Source Software (FOSS</a:t>
+            </a:r>
+            <a:r>
+              <a:rPr lang="en-US" sz="6000" dirty="0" smtClean="0">
+                <a:latin typeface="Fira Sans" panose="020B0603050000020004" pitchFamily="34" charset="0"/>
+              </a:rPr>
+              <a:t>) and can be further hacked or improved upon for a variety of different applications</a:t>
+            </a:r>
+            <a:endParaRPr lang="en-US" sz="6000" dirty="0">
+              <a:latin typeface="Fira Sans" panose="020B0603050000020004" pitchFamily="34" charset="0"/>
+            </a:endParaRPr>
+          </a:p>
+        </p:txBody>
+      </p:sp>
+      <p:sp>
+        <p:nvSpPr>
+          <p:cNvPr id="15" name="TextBox 14"/>
+          <p:cNvSpPr txBox="1"/>
+          <p:nvPr/>
+        </p:nvSpPr>
+        <p:spPr>
+          <a:xfrm>
+            <a:off x="14466323" y="6593305"/>
+            <a:ext cx="26659682" cy="1938992"/>
+          </a:xfrm>
+          <a:prstGeom prst="rect">
+            <a:avLst/>
+          </a:prstGeom>
+          <a:noFill/>
+        </p:spPr>
+        <p:txBody>
+          <a:bodyPr wrap="square" rtlCol="0">
+            <a:spAutoFit/>
+          </a:bodyPr>
+          <a:lstStyle/>
+          <a:p>
+            <a:r>
+              <a:rPr lang="en-US" sz="6000" b="1" dirty="0" smtClean="0">
+                <a:latin typeface="Fira Sans" panose="020B0603050000020004" pitchFamily="34" charset="0"/>
+              </a:rPr>
+              <a:t>This project </a:t>
+            </a:r>
+            <a:r>
+              <a:rPr lang="en-US" sz="6000" dirty="0" smtClean="0">
+                <a:latin typeface="Fira Sans" panose="020B0603050000020004" pitchFamily="34" charset="0"/>
+              </a:rPr>
+              <a:t>will be focused on developing a “smart shelf</a:t>
+            </a:r>
+            <a:r>
+              <a:rPr lang="en-US" sz="6000" dirty="0" smtClean="0">
+                <a:latin typeface="Fira Sans" panose="020B0603050000020004" pitchFamily="34" charset="0"/>
+              </a:rPr>
+              <a:t>” </a:t>
+            </a:r>
+            <a:r>
+              <a:rPr lang="en-US" sz="6000" dirty="0" smtClean="0">
+                <a:latin typeface="Fira Sans" panose="020B0603050000020004" pitchFamily="34" charset="0"/>
+              </a:rPr>
+              <a:t>that can track </a:t>
+            </a:r>
+            <a:r>
+              <a:rPr lang="en-US" sz="6000" dirty="0" smtClean="0">
+                <a:latin typeface="Fira Sans" panose="020B0603050000020004" pitchFamily="34" charset="0"/>
+              </a:rPr>
+              <a:t>store traffic </a:t>
+            </a:r>
+            <a:r>
+              <a:rPr lang="en-US" sz="6000" dirty="0" smtClean="0">
+                <a:latin typeface="Fira Sans" panose="020B0603050000020004" pitchFamily="34" charset="0"/>
+              </a:rPr>
+              <a:t>and </a:t>
+            </a:r>
+            <a:r>
+              <a:rPr lang="en-US" sz="6000" dirty="0" smtClean="0">
+                <a:latin typeface="Fira Sans" panose="020B0603050000020004" pitchFamily="34" charset="0"/>
+              </a:rPr>
+              <a:t>shelf stock throughout </a:t>
+            </a:r>
+            <a:r>
+              <a:rPr lang="en-US" sz="6000" dirty="0" smtClean="0">
+                <a:latin typeface="Fira Sans" panose="020B0603050000020004" pitchFamily="34" charset="0"/>
+              </a:rPr>
+              <a:t>the store. </a:t>
+            </a:r>
+            <a:endParaRPr lang="en-US" sz="6000" dirty="0">
+              <a:latin typeface="Fira Sans" panose="020B0603050000020004" pitchFamily="34" charset="0"/>
+            </a:endParaRPr>
+          </a:p>
+        </p:txBody>
+      </p:sp>
+      <p:sp>
+        <p:nvSpPr>
+          <p:cNvPr id="17" name="TextBox 16"/>
+          <p:cNvSpPr txBox="1"/>
+          <p:nvPr/>
+        </p:nvSpPr>
+        <p:spPr>
+          <a:xfrm>
+            <a:off x="14466321" y="16141964"/>
+            <a:ext cx="9019321" cy="4708981"/>
+          </a:xfrm>
+          <a:prstGeom prst="rect">
+            <a:avLst/>
+          </a:prstGeom>
+          <a:noFill/>
+        </p:spPr>
+        <p:txBody>
+          <a:bodyPr wrap="square" rtlCol="0">
+            <a:spAutoFit/>
+          </a:bodyPr>
+          <a:lstStyle/>
+          <a:p>
+            <a:r>
+              <a:rPr lang="en-US" sz="6000" b="1" dirty="0" smtClean="0">
+                <a:latin typeface="Fira Sans" panose="020B0603050000020004" pitchFamily="34" charset="0"/>
+              </a:rPr>
+              <a:t>Th</a:t>
+            </a:r>
+            <a:r>
+              <a:rPr lang="en-US" sz="6000" b="1" dirty="0" smtClean="0">
+                <a:latin typeface="Fira Sans" panose="020B0603050000020004" pitchFamily="34" charset="0"/>
+              </a:rPr>
+              <a:t>e </a:t>
+            </a:r>
+            <a:r>
+              <a:rPr lang="en-US" sz="6000" b="1" dirty="0" smtClean="0">
+                <a:latin typeface="Fira Sans" panose="020B0603050000020004" pitchFamily="34" charset="0"/>
+              </a:rPr>
+              <a:t>software/Web component </a:t>
+            </a:r>
+            <a:r>
+              <a:rPr lang="en-US" sz="6000" dirty="0" smtClean="0">
+                <a:latin typeface="Fira Sans" panose="020B0603050000020004" pitchFamily="34" charset="0"/>
+              </a:rPr>
+              <a:t>allows </a:t>
+            </a:r>
+            <a:r>
+              <a:rPr lang="en-US" sz="6000" dirty="0" smtClean="0">
+                <a:latin typeface="Fira Sans" panose="020B0603050000020004" pitchFamily="34" charset="0"/>
+              </a:rPr>
+              <a:t>a user to </a:t>
+            </a:r>
+            <a:r>
+              <a:rPr lang="en-US" sz="6000" dirty="0" smtClean="0">
+                <a:latin typeface="Fira Sans" panose="020B0603050000020004" pitchFamily="34" charset="0"/>
+              </a:rPr>
+              <a:t>visualize data collected from </a:t>
+            </a:r>
+            <a:r>
+              <a:rPr lang="en-US" sz="6000" dirty="0" smtClean="0">
+                <a:latin typeface="Fira Sans" panose="020B0603050000020004" pitchFamily="34" charset="0"/>
+              </a:rPr>
               <a:t>the </a:t>
             </a:r>
             <a:r>
-              <a:rPr lang="en-US" sz="6000" dirty="0" smtClean="0"/>
-              <a:t>sensor / hardware</a:t>
-            </a:r>
-            <a:r>
-              <a:rPr lang="en-US" sz="6000" dirty="0" smtClean="0"/>
-              <a:t> </a:t>
-            </a:r>
-          </a:p>
-          <a:p>
-            <a:r>
-              <a:rPr lang="en-US" sz="6000" dirty="0" smtClean="0"/>
-              <a:t>component </a:t>
-            </a:r>
-            <a:r>
-              <a:rPr lang="en-US" sz="6000" dirty="0" smtClean="0"/>
-              <a:t>which</a:t>
-            </a:r>
-            <a:r>
-              <a:rPr lang="en-US" sz="6000" dirty="0" smtClean="0"/>
-              <a:t> deals </a:t>
-            </a:r>
-            <a:r>
-              <a:rPr lang="en-US" sz="6000" dirty="0" smtClean="0"/>
-              <a:t>with the development of a prototype </a:t>
-            </a:r>
-          </a:p>
-          <a:p>
-            <a:r>
-              <a:rPr lang="en-US" sz="6000" dirty="0" smtClean="0"/>
-              <a:t>smart shelf that can update sensor readings</a:t>
-            </a:r>
-          </a:p>
-          <a:p>
-            <a:r>
-              <a:rPr lang="en-US" sz="6000" dirty="0" smtClean="0"/>
-              <a:t>to OGC </a:t>
-            </a:r>
-            <a:r>
-              <a:rPr lang="en-US" sz="6000" dirty="0" err="1" smtClean="0"/>
-              <a:t>SensorThings</a:t>
-            </a:r>
-            <a:r>
-              <a:rPr lang="en-US" sz="6000" dirty="0" smtClean="0"/>
-              <a:t> </a:t>
-            </a:r>
-            <a:r>
-              <a:rPr lang="en-US" sz="6000" dirty="0" smtClean="0"/>
-              <a:t>API</a:t>
-            </a:r>
-            <a:r>
-              <a:rPr lang="en-US" sz="6000" dirty="0" smtClean="0"/>
-              <a:t>.</a:t>
-            </a:r>
-            <a:endParaRPr lang="en-US" sz="6000" dirty="0"/>
-          </a:p>
-        </p:txBody>
-      </p:sp>
+              <a:rPr lang="en-US" sz="6000" dirty="0" smtClean="0">
+                <a:latin typeface="Fira Sans" panose="020B0603050000020004" pitchFamily="34" charset="0"/>
+              </a:rPr>
+              <a:t> shelves</a:t>
+            </a:r>
+            <a:r>
+              <a:rPr lang="en-US" sz="6000" dirty="0" smtClean="0">
+                <a:latin typeface="Fira Sans" panose="020B0603050000020004" pitchFamily="34" charset="0"/>
+              </a:rPr>
+              <a:t>.   </a:t>
+            </a:r>
+            <a:endParaRPr lang="en-US" sz="6000" b="1" dirty="0">
+              <a:latin typeface="Fira Sans" panose="020B0603050000020004" pitchFamily="34" charset="0"/>
+            </a:endParaRPr>
+          </a:p>
+        </p:txBody>
+      </p:sp>
+      <p:cxnSp>
+        <p:nvCxnSpPr>
+          <p:cNvPr id="3" name="Straight Connector 2"/>
+          <p:cNvCxnSpPr/>
+          <p:nvPr/>
+        </p:nvCxnSpPr>
+        <p:spPr>
+          <a:xfrm>
+            <a:off x="1915967" y="3938344"/>
+            <a:ext cx="40194559" cy="0"/>
+          </a:xfrm>
+          <a:prstGeom prst="line">
+            <a:avLst/>
+          </a:prstGeom>
+        </p:spPr>
+        <p:style>
+          <a:lnRef idx="2">
+            <a:schemeClr val="accent1"/>
+          </a:lnRef>
+          <a:fillRef idx="0">
+            <a:schemeClr val="accent1"/>
+          </a:fillRef>
+          <a:effectRef idx="1">
+            <a:schemeClr val="accent1"/>
+          </a:effectRef>
+          <a:fontRef idx="minor">
+            <a:schemeClr val="tx1"/>
+          </a:fontRef>
+        </p:style>
+      </p:cxnSp>
       <p:pic>
         <p:nvPicPr>
-          <p:cNvPr id="13" name="Picture 12"/>
+          <p:cNvPr id="10" name="Picture 9"/>
           <p:cNvPicPr>
             <a:picLocks noChangeAspect="1"/>
           </p:cNvPicPr>
           <p:nvPr/>
         </p:nvPicPr>
         <p:blipFill>
-          <a:blip r:embed="rId4"/>
+          <a:blip r:embed="rId4">
+            <a:extLst>
+              <a:ext uri="{28A0092B-C50C-407E-A947-70E740481C1C}">
+                <a14:useLocalDpi xmlns:a14="http://schemas.microsoft.com/office/drawing/2010/main" val="0"/>
+              </a:ext>
+            </a:extLst>
+          </a:blip>
           <a:stretch>
             <a:fillRect/>
           </a:stretch>
         </p:blipFill>
         <p:spPr>
           <a:xfrm>
-            <a:off x="2871898" y="15062074"/>
-            <a:ext cx="10321037" cy="7306914"/>
+            <a:off x="24056702" y="9049281"/>
+            <a:ext cx="17069303" cy="11892648"/>
           </a:xfrm>
           <a:prstGeom prst="rect">
             <a:avLst/>
@@ -3431,14 +3778,14 @@
       </p:pic>
       <p:sp>
         <p:nvSpPr>
-          <p:cNvPr id="14" name="TextBox 13"/>
+          <p:cNvPr id="18" name="TextBox 17"/>
           <p:cNvSpPr txBox="1"/>
           <p:nvPr/>
         </p:nvSpPr>
         <p:spPr>
           <a:xfrm>
-            <a:off x="23916875" y="13538629"/>
-            <a:ext cx="19974325" cy="2862322"/>
+            <a:off x="24056702" y="21992162"/>
+            <a:ext cx="12742132" cy="3785652"/>
           </a:xfrm>
           <a:prstGeom prst="rect">
             <a:avLst/>
@@ -3452,43 +3799,75 @@
           <a:lstStyle/>
           <a:p>
             <a:r>
-              <a:rPr lang="en-US" sz="6000" b="1" dirty="0" smtClean="0"/>
-              <a:t>This project </a:t>
-            </a:r>
-            <a:r>
-              <a:rPr lang="en-US" sz="6000" dirty="0" smtClean="0"/>
-              <a:t>will be developed as a Free, Open-Source Software (FOSS) hopes to serve as an </a:t>
-            </a:r>
-            <a:r>
-              <a:rPr lang="en-US" sz="6000" dirty="0" err="1" smtClean="0"/>
-              <a:t>exmaple</a:t>
-            </a:r>
-            <a:r>
-              <a:rPr lang="en-US" sz="6000" dirty="0" smtClean="0"/>
-              <a:t> for developers looking to develop an </a:t>
-            </a:r>
-            <a:r>
-              <a:rPr lang="en-US" sz="6000" dirty="0" err="1" smtClean="0"/>
+              <a:rPr lang="en-US" sz="6000" b="1" dirty="0" smtClean="0">
+                <a:latin typeface="Fira Sans" panose="020B0603050000020004" pitchFamily="34" charset="0"/>
+              </a:rPr>
+              <a:t>One goal </a:t>
+            </a:r>
+            <a:r>
+              <a:rPr lang="en-US" sz="6000" dirty="0" smtClean="0">
+                <a:latin typeface="Fira Sans" panose="020B0603050000020004" pitchFamily="34" charset="0"/>
+              </a:rPr>
+              <a:t>of this project is to serve as an example for developers looking to develop an </a:t>
+            </a:r>
+            <a:r>
+              <a:rPr lang="en-US" sz="6000" dirty="0" err="1" smtClean="0">
+                <a:latin typeface="Fira Sans" panose="020B0603050000020004" pitchFamily="34" charset="0"/>
+              </a:rPr>
               <a:t>IoT</a:t>
             </a:r>
             <a:r>
-              <a:rPr lang="en-US" sz="6000" dirty="0" smtClean="0"/>
-              <a:t> application using the OGC standard. </a:t>
-            </a:r>
-            <a:endParaRPr lang="en-US" sz="6000" dirty="0"/>
-          </a:p>
-        </p:txBody>
-      </p:sp>
-      <p:sp>
-        <p:nvSpPr>
-          <p:cNvPr id="15" name="TextBox 14"/>
+              <a:rPr lang="en-US" sz="6000" dirty="0" smtClean="0">
+                <a:latin typeface="Fira Sans" panose="020B0603050000020004" pitchFamily="34" charset="0"/>
+              </a:rPr>
+              <a:t> application using the OGC standard</a:t>
+            </a:r>
+            <a:endParaRPr lang="en-US" sz="6000" dirty="0">
+              <a:latin typeface="Fira Sans" panose="020B0603050000020004" pitchFamily="34" charset="0"/>
+            </a:endParaRPr>
+          </a:p>
+        </p:txBody>
+      </p:sp>
+      <p:pic>
+        <p:nvPicPr>
+          <p:cNvPr id="19" name="Picture 18"/>
+          <p:cNvPicPr>
+            <a:picLocks noChangeAspect="1"/>
+          </p:cNvPicPr>
+          <p:nvPr/>
+        </p:nvPicPr>
+        <p:blipFill>
+          <a:blip r:embed="rId5">
+            <a:extLst>
+              <a:ext uri="{28A0092B-C50C-407E-A947-70E740481C1C}">
+                <a14:useLocalDpi xmlns:a14="http://schemas.microsoft.com/office/drawing/2010/main" val="0"/>
+              </a:ext>
+            </a:extLst>
+          </a:blip>
+          <a:stretch>
+            <a:fillRect/>
+          </a:stretch>
+        </p:blipFill>
+        <p:spPr>
+          <a:xfrm>
+            <a:off x="2928007" y="4101955"/>
+            <a:ext cx="3877949" cy="1938975"/>
+          </a:xfrm>
+          <a:prstGeom prst="rect">
+            <a:avLst/>
+          </a:prstGeom>
+        </p:spPr>
+      </p:pic>
+      <p:sp>
+        <p:nvSpPr>
+          <p:cNvPr id="20" name="TextBox 19"/>
           <p:cNvSpPr txBox="1"/>
           <p:nvPr/>
         </p:nvSpPr>
         <p:spPr>
           <a:xfrm>
-            <a:off x="14142091" y="17339031"/>
-            <a:ext cx="19549567" cy="2862322"/>
+            <a:off x="5596966" y="4609777"/>
+            <a:ext cx="32832560" cy="923330"/>
           </a:xfrm>
           <a:prstGeom prst="rect">
             <a:avLst/>
@@ -3496,66 +3875,104 @@
           <a:noFill/>
         </p:spPr>
         <p:txBody>
-          <a:bodyPr wrap="none" rtlCol="0">
+          <a:bodyPr wrap="square" rtlCol="0">
             <a:spAutoFit/>
           </a:bodyPr>
           <a:lstStyle/>
           <a:p>
-            <a:r>
-              <a:rPr lang="en-US" sz="6000" b="1" dirty="0" smtClean="0"/>
-              <a:t>This project </a:t>
-            </a:r>
-            <a:r>
-              <a:rPr lang="en-US" sz="6000" dirty="0" smtClean="0"/>
-              <a:t>will be focused on developing a “smart shelf</a:t>
-            </a:r>
-            <a:r>
-              <a:rPr lang="en-US" sz="6000" dirty="0" smtClean="0"/>
-              <a:t>”</a:t>
-            </a:r>
-          </a:p>
-          <a:p>
-            <a:r>
-              <a:rPr lang="en-US" sz="6000" dirty="0" smtClean="0"/>
+            <a:pPr algn="ctr"/>
+            <a:r>
+              <a:rPr lang="en-US" sz="5400" dirty="0" smtClean="0">
+                <a:latin typeface="Fira Sans Light" panose="020B0603050000020004" pitchFamily="34" charset="0"/>
+                <a:ea typeface="Fira Sans Light" panose="020B0603050000020004" pitchFamily="34" charset="0"/>
+                <a:cs typeface="Segoe UI" panose="020B0502040204020203" pitchFamily="34" charset="0"/>
+              </a:rPr>
+              <a:t>Ben </a:t>
+            </a:r>
+            <a:r>
+              <a:rPr lang="en-US" sz="5400" dirty="0" err="1" smtClean="0">
+                <a:latin typeface="Fira Sans Light" panose="020B0603050000020004" pitchFamily="34" charset="0"/>
+                <a:ea typeface="Fira Sans Light" panose="020B0603050000020004" pitchFamily="34" charset="0"/>
+                <a:cs typeface="Segoe UI" panose="020B0502040204020203" pitchFamily="34" charset="0"/>
+              </a:rPr>
+              <a:t>Trodd</a:t>
+            </a:r>
+            <a:r>
+              <a:rPr lang="en-US" sz="5400" dirty="0" smtClean="0">
+                <a:latin typeface="Fira Sans Light" panose="020B0603050000020004" pitchFamily="34" charset="0"/>
+                <a:ea typeface="Fira Sans Light" panose="020B0603050000020004" pitchFamily="34" charset="0"/>
+                <a:cs typeface="Segoe UI" panose="020B0502040204020203" pitchFamily="34" charset="0"/>
+              </a:rPr>
+              <a:t>, Jeremy Steward, </a:t>
+            </a:r>
+            <a:r>
+              <a:rPr lang="en-US" sz="5400" dirty="0" err="1" smtClean="0">
+                <a:latin typeface="Fira Sans Light" panose="020B0603050000020004" pitchFamily="34" charset="0"/>
+                <a:ea typeface="Fira Sans Light" panose="020B0603050000020004" pitchFamily="34" charset="0"/>
+                <a:cs typeface="Segoe UI" panose="020B0502040204020203" pitchFamily="34" charset="0"/>
+              </a:rPr>
+              <a:t>Harshini</a:t>
+            </a:r>
+            <a:r>
+              <a:rPr lang="en-US" sz="5400" dirty="0" smtClean="0">
+                <a:latin typeface="Fira Sans Light" panose="020B0603050000020004" pitchFamily="34" charset="0"/>
+                <a:ea typeface="Fira Sans Light" panose="020B0603050000020004" pitchFamily="34" charset="0"/>
+                <a:cs typeface="Segoe UI" panose="020B0502040204020203" pitchFamily="34" charset="0"/>
+              </a:rPr>
               <a:t> </a:t>
             </a:r>
             <a:r>
-              <a:rPr lang="en-US" sz="6000" dirty="0" smtClean="0"/>
-              <a:t>that can track customers and customer purchases or interests</a:t>
-            </a:r>
-            <a:r>
-              <a:rPr lang="en-US" sz="6000" dirty="0" smtClean="0"/>
-              <a:t> </a:t>
-            </a:r>
-          </a:p>
-          <a:p>
-            <a:r>
-              <a:rPr lang="en-US" sz="6000" dirty="0" smtClean="0"/>
-              <a:t>throughout </a:t>
-            </a:r>
-            <a:r>
-              <a:rPr lang="en-US" sz="6000" dirty="0" smtClean="0"/>
-              <a:t>the store. </a:t>
-            </a:r>
-            <a:endParaRPr lang="en-US" sz="6000" dirty="0"/>
-          </a:p>
-        </p:txBody>
-      </p:sp>
-      <p:sp>
-        <p:nvSpPr>
-          <p:cNvPr id="17" name="TextBox 16"/>
+              <a:rPr lang="en-US" sz="5400" dirty="0" err="1" smtClean="0">
+                <a:latin typeface="Fira Sans Light" panose="020B0603050000020004" pitchFamily="34" charset="0"/>
+                <a:ea typeface="Fira Sans Light" panose="020B0603050000020004" pitchFamily="34" charset="0"/>
+                <a:cs typeface="Segoe UI" panose="020B0502040204020203" pitchFamily="34" charset="0"/>
+              </a:rPr>
+              <a:t>Nanduri</a:t>
+            </a:r>
+            <a:r>
+              <a:rPr lang="en-US" sz="5400" dirty="0" smtClean="0">
+                <a:latin typeface="Fira Sans Light" panose="020B0603050000020004" pitchFamily="34" charset="0"/>
+                <a:ea typeface="Fira Sans Light" panose="020B0603050000020004" pitchFamily="34" charset="0"/>
+                <a:cs typeface="Segoe UI" panose="020B0502040204020203" pitchFamily="34" charset="0"/>
+              </a:rPr>
+              <a:t>, Alexandra Cummins and Kathleen </a:t>
+            </a:r>
+            <a:r>
+              <a:rPr lang="en-US" sz="5400" dirty="0" err="1" smtClean="0">
+                <a:latin typeface="Fira Sans Light" panose="020B0603050000020004" pitchFamily="34" charset="0"/>
+                <a:ea typeface="Fira Sans Light" panose="020B0603050000020004" pitchFamily="34" charset="0"/>
+                <a:cs typeface="Segoe UI" panose="020B0502040204020203" pitchFamily="34" charset="0"/>
+              </a:rPr>
+              <a:t>Ang</a:t>
+            </a:r>
+            <a:endParaRPr lang="en-US" sz="5400" dirty="0">
+              <a:latin typeface="Fira Sans Light" panose="020B0603050000020004" pitchFamily="34" charset="0"/>
+              <a:ea typeface="Fira Sans Light" panose="020B0603050000020004" pitchFamily="34" charset="0"/>
+              <a:cs typeface="Segoe UI" panose="020B0502040204020203" pitchFamily="34" charset="0"/>
+            </a:endParaRPr>
+          </a:p>
+        </p:txBody>
+      </p:sp>
+      <p:sp>
+        <p:nvSpPr>
+          <p:cNvPr id="21" name="TextBox 20"/>
           <p:cNvSpPr txBox="1"/>
           <p:nvPr/>
         </p:nvSpPr>
         <p:spPr>
           <a:xfrm>
-            <a:off x="1867841" y="24363745"/>
-            <a:ext cx="18901101" cy="3785652"/>
+            <a:off x="15544800" y="21713599"/>
+            <a:ext cx="5438274" cy="4062651"/>
           </a:xfrm>
           <a:prstGeom prst="rect">
             <a:avLst/>
           </a:prstGeom>
           <a:noFill/>
+          <a:ln>
+            <a:solidFill>
+              <a:schemeClr val="tx1"/>
+            </a:solidFill>
+          </a:ln>
         </p:spPr>
         <p:txBody>
           <a:bodyPr wrap="square" rtlCol="0">
@@ -3564,40 +3981,18 @@
           <a:lstStyle/>
           <a:p>
             <a:r>
-              <a:rPr lang="en-US" sz="6000" b="1" dirty="0" smtClean="0"/>
-              <a:t>Another major aspect </a:t>
-            </a:r>
-            <a:r>
-              <a:rPr lang="en-US" sz="6000" dirty="0" smtClean="0"/>
-              <a:t>of the project is a </a:t>
-            </a:r>
-            <a:r>
-              <a:rPr lang="en-US" sz="6000" dirty="0" smtClean="0"/>
-              <a:t>a software /</a:t>
-            </a:r>
-          </a:p>
-          <a:p>
-            <a:r>
-              <a:rPr lang="en-US" sz="6000" dirty="0" smtClean="0"/>
-              <a:t>Web component, which allows a user to </a:t>
-            </a:r>
-          </a:p>
-          <a:p>
-            <a:r>
-              <a:rPr lang="en-US" sz="6000" dirty="0" smtClean="0"/>
-              <a:t>interact/acquire readings from the prototype</a:t>
-            </a:r>
-          </a:p>
-          <a:p>
-            <a:r>
-              <a:rPr lang="en-US" sz="6000" dirty="0" smtClean="0"/>
-              <a:t>shelves.</a:t>
-            </a:r>
-            <a:r>
-              <a:rPr lang="en-US" sz="6000" dirty="0" smtClean="0"/>
-              <a:t>   </a:t>
-            </a:r>
-            <a:endParaRPr lang="en-US" sz="6000" b="1" dirty="0"/>
+              <a:rPr lang="en-CA" dirty="0" smtClean="0">
+                <a:solidFill>
+                  <a:srgbClr val="FF0000"/>
+                </a:solidFill>
+              </a:rPr>
+              <a:t>Insert prototype here?</a:t>
+            </a:r>
+            <a:endParaRPr lang="en-CA" dirty="0">
+              <a:solidFill>
+                <a:srgbClr val="FF0000"/>
+              </a:solidFill>
+            </a:endParaRPr>
           </a:p>
         </p:txBody>
       </p:sp>

</xml_diff>